<commit_message>
Update colors for better black and white printing
</commit_message>
<xml_diff>
--- a/adelgid_predator/als_graphical_abstract.pptx
+++ b/adelgid_predator/als_graphical_abstract.pptx
@@ -217,7 +217,7 @@
           <a:p>
             <a:fld id="{BF70D90F-BB8A-5A44-8C77-3A9386126CB2}" type="datetimeFigureOut">
               <a:rPr lang="en-US" smtClean="0"/>
-              <a:t>12/9/21</a:t>
+              <a:t>7/12/22</a:t>
             </a:fld>
             <a:endParaRPr lang="en-US"/>
           </a:p>
@@ -1982,7 +1982,7 @@
           <a:p>
             <a:fld id="{F0C5A7E1-C1D0-F44F-A1F1-0112DD707905}" type="datetimeFigureOut">
               <a:rPr lang="en-US" smtClean="0"/>
-              <a:t>12/9/21</a:t>
+              <a:t>7/12/22</a:t>
             </a:fld>
             <a:endParaRPr lang="en-US"/>
           </a:p>
@@ -3441,7 +3441,7 @@
           <a:p>
             <a:fld id="{F0C5A7E1-C1D0-F44F-A1F1-0112DD707905}" type="datetimeFigureOut">
               <a:rPr lang="en-US" smtClean="0"/>
-              <a:t>12/9/21</a:t>
+              <a:t>7/12/22</a:t>
             </a:fld>
             <a:endParaRPr lang="en-US"/>
           </a:p>
@@ -4894,7 +4894,7 @@
           <a:p>
             <a:fld id="{F0C5A7E1-C1D0-F44F-A1F1-0112DD707905}" type="datetimeFigureOut">
               <a:rPr lang="en-US" smtClean="0"/>
-              <a:t>12/9/21</a:t>
+              <a:t>7/12/22</a:t>
             </a:fld>
             <a:endParaRPr lang="en-US"/>
           </a:p>
@@ -6349,7 +6349,7 @@
           <a:p>
             <a:fld id="{F0C5A7E1-C1D0-F44F-A1F1-0112DD707905}" type="datetimeFigureOut">
               <a:rPr lang="en-US" smtClean="0"/>
-              <a:t>12/9/21</a:t>
+              <a:t>7/12/22</a:t>
             </a:fld>
             <a:endParaRPr lang="en-US"/>
           </a:p>
@@ -7857,7 +7857,7 @@
           <a:p>
             <a:fld id="{F0C5A7E1-C1D0-F44F-A1F1-0112DD707905}" type="datetimeFigureOut">
               <a:rPr lang="en-US" smtClean="0"/>
-              <a:t>12/9/21</a:t>
+              <a:t>7/12/22</a:t>
             </a:fld>
             <a:endParaRPr lang="en-US"/>
           </a:p>
@@ -9378,7 +9378,7 @@
           <a:p>
             <a:fld id="{F0C5A7E1-C1D0-F44F-A1F1-0112DD707905}" type="datetimeFigureOut">
               <a:rPr lang="en-US" smtClean="0"/>
-              <a:t>12/9/21</a:t>
+              <a:t>7/12/22</a:t>
             </a:fld>
             <a:endParaRPr lang="en-US"/>
           </a:p>
@@ -11043,7 +11043,7 @@
           <a:p>
             <a:fld id="{F0C5A7E1-C1D0-F44F-A1F1-0112DD707905}" type="datetimeFigureOut">
               <a:rPr lang="en-US" smtClean="0"/>
-              <a:t>12/9/21</a:t>
+              <a:t>7/12/22</a:t>
             </a:fld>
             <a:endParaRPr lang="en-US"/>
           </a:p>
@@ -12441,7 +12441,7 @@
           <a:p>
             <a:fld id="{F0C5A7E1-C1D0-F44F-A1F1-0112DD707905}" type="datetimeFigureOut">
               <a:rPr lang="en-US" smtClean="0"/>
-              <a:t>12/9/21</a:t>
+              <a:t>7/12/22</a:t>
             </a:fld>
             <a:endParaRPr lang="en-US"/>
           </a:p>
@@ -12541,7 +12541,7 @@
           <a:p>
             <a:fld id="{F0C5A7E1-C1D0-F44F-A1F1-0112DD707905}" type="datetimeFigureOut">
               <a:rPr lang="en-US" smtClean="0"/>
-              <a:t>12/9/21</a:t>
+              <a:t>7/12/22</a:t>
             </a:fld>
             <a:endParaRPr lang="en-US"/>
           </a:p>
@@ -14067,7 +14067,7 @@
           <a:p>
             <a:fld id="{F0C5A7E1-C1D0-F44F-A1F1-0112DD707905}" type="datetimeFigureOut">
               <a:rPr lang="en-US" smtClean="0"/>
-              <a:t>12/9/21</a:t>
+              <a:t>7/12/22</a:t>
             </a:fld>
             <a:endParaRPr lang="en-US"/>
           </a:p>
@@ -15603,7 +15603,7 @@
           <a:p>
             <a:fld id="{F0C5A7E1-C1D0-F44F-A1F1-0112DD707905}" type="datetimeFigureOut">
               <a:rPr lang="en-US" smtClean="0"/>
-              <a:t>12/9/21</a:t>
+              <a:t>7/12/22</a:t>
             </a:fld>
             <a:endParaRPr lang="en-US"/>
           </a:p>
@@ -15826,7 +15826,7 @@
           <a:p>
             <a:fld id="{F0C5A7E1-C1D0-F44F-A1F1-0112DD707905}" type="datetimeFigureOut">
               <a:rPr lang="en-US" smtClean="0"/>
-              <a:t>12/9/21</a:t>
+              <a:t>7/12/22</a:t>
             </a:fld>
             <a:endParaRPr lang="en-US"/>
           </a:p>
@@ -16291,7 +16291,7 @@
         </p:nvGrpSpPr>
         <p:grpSpPr>
           <a:xfrm>
-            <a:off x="361573" y="39297"/>
+            <a:off x="361573" y="10009"/>
             <a:ext cx="23504266" cy="9085171"/>
             <a:chOff x="361573" y="39297"/>
             <a:chExt cx="23504266" cy="9085171"/>
@@ -16586,7 +16586,9 @@
               </a:solidFill>
               <a:ln w="41275">
                 <a:solidFill>
-                  <a:srgbClr val="F6A21F"/>
+                  <a:srgbClr val="F6A21F">
+                    <a:alpha val="50196"/>
+                  </a:srgbClr>
                 </a:solidFill>
                 <a:prstDash val="dash"/>
               </a:ln>
@@ -16612,10 +16614,13 @@
               <a:lstStyle/>
               <a:p>
                 <a:pPr algn="ctr"/>
-                <a:endParaRPr lang="en-US" sz="2194" b="1">
-                  <a:latin typeface="Arial" panose="020B0604020202020204" pitchFamily="34" charset="0"/>
-                  <a:cs typeface="Arial" panose="020B0604020202020204" pitchFamily="34" charset="0"/>
-                </a:endParaRPr>
+                <a:r>
+                  <a:rPr lang="en-US" sz="2194" b="1" dirty="0">
+                    <a:latin typeface="Arial" panose="020B0604020202020204" pitchFamily="34" charset="0"/>
+                    <a:cs typeface="Arial" panose="020B0604020202020204" pitchFamily="34" charset="0"/>
+                  </a:rPr>
+                  <a:t>.</a:t>
+                </a:r>
               </a:p>
             </p:txBody>
           </p:sp>
@@ -16633,19 +16638,19 @@
             </p:nvSpPr>
             <p:spPr>
               <a:xfrm>
-                <a:off x="687821" y="9675383"/>
-                <a:ext cx="847852" cy="56530"/>
+                <a:off x="674984" y="9685720"/>
+                <a:ext cx="862818" cy="91642"/>
               </a:xfrm>
               <a:prstGeom prst="rect">
                 <a:avLst/>
               </a:prstGeom>
               <a:solidFill>
-                <a:srgbClr val="F6A21F"/>
+                <a:srgbClr val="F6A21F">
+                  <a:alpha val="50196"/>
+                </a:srgbClr>
               </a:solidFill>
               <a:ln w="34925">
-                <a:solidFill>
-                  <a:srgbClr val="F6A21F"/>
-                </a:solidFill>
+                <a:noFill/>
                 <a:prstDash val="solid"/>
               </a:ln>
             </p:spPr>
@@ -16691,19 +16696,19 @@
             </p:nvSpPr>
             <p:spPr>
               <a:xfrm>
-                <a:off x="687292" y="10303163"/>
-                <a:ext cx="847852" cy="56530"/>
+                <a:off x="674984" y="10281832"/>
+                <a:ext cx="862818" cy="90033"/>
               </a:xfrm>
               <a:prstGeom prst="rect">
                 <a:avLst/>
               </a:prstGeom>
               <a:solidFill>
-                <a:srgbClr val="0078B6"/>
+                <a:srgbClr val="0078B6">
+                  <a:alpha val="80000"/>
+                </a:srgbClr>
               </a:solidFill>
               <a:ln w="34925">
-                <a:solidFill>
-                  <a:srgbClr val="0078B6"/>
-                </a:solidFill>
+                <a:noFill/>
                 <a:prstDash val="solid"/>
               </a:ln>
             </p:spPr>
@@ -16760,7 +16765,9 @@
               </a:solidFill>
               <a:ln w="41275">
                 <a:solidFill>
-                  <a:srgbClr val="0078B6"/>
+                  <a:srgbClr val="0078B6">
+                    <a:alpha val="80000"/>
+                  </a:srgbClr>
                 </a:solidFill>
                 <a:prstDash val="dash"/>
               </a:ln>
@@ -16954,12 +16961,12 @@
                   <a:gd name="adj" fmla="val 328"/>
                 </a:avLst>
               </a:prstGeom>
-              <a:solidFill>
-                <a:srgbClr val="0078B6"/>
-              </a:solidFill>
-              <a:ln w="25400">
+              <a:noFill/>
+              <a:ln w="28575">
                 <a:solidFill>
-                  <a:srgbClr val="0078B6"/>
+                  <a:srgbClr val="0078B6">
+                    <a:alpha val="80000"/>
+                  </a:srgbClr>
                 </a:solidFill>
                 <a:prstDash val="solid"/>
               </a:ln>
@@ -17197,9 +17204,12 @@
                   <a:gd name="adj" fmla="val 257"/>
                 </a:avLst>
               </a:prstGeom>
+              <a:noFill/>
               <a:ln w="25400">
                 <a:solidFill>
-                  <a:srgbClr val="0078B6"/>
+                  <a:srgbClr val="0078B6">
+                    <a:alpha val="80000"/>
+                  </a:srgbClr>
                 </a:solidFill>
                 <a:prstDash val="sysDash"/>
               </a:ln>
@@ -17534,12 +17544,12 @@
                 </a:avLst>
               </a:prstGeom>
               <a:solidFill>
-                <a:srgbClr val="F6A21F"/>
+                <a:srgbClr val="F6A21F">
+                  <a:alpha val="50196"/>
+                </a:srgbClr>
               </a:solidFill>
               <a:ln>
-                <a:solidFill>
-                  <a:srgbClr val="F6A21F"/>
-                </a:solidFill>
+                <a:noFill/>
                 <a:prstDash val="solid"/>
               </a:ln>
             </p:spPr>
@@ -17834,7 +17844,9 @@
               </a:prstGeom>
               <a:ln w="25400">
                 <a:solidFill>
-                  <a:srgbClr val="F6A21F"/>
+                  <a:srgbClr val="F6A21F">
+                    <a:alpha val="50196"/>
+                  </a:srgbClr>
                 </a:solidFill>
                 <a:prstDash val="sysDash"/>
               </a:ln>
@@ -20548,7 +20560,7 @@
                   <a:latin typeface="Arial" panose="020B0604020202020204" pitchFamily="34" charset="0"/>
                   <a:cs typeface="Arial" panose="020B0604020202020204" pitchFamily="34" charset="0"/>
                 </a:rPr>
-                <a:t>Modeling interactions of hemlock woolly adelgid and two biological control predatory beetle species in Great Smoky Mountains National Park</a:t>
+                <a:t>Modeling interactions of hemlock woolly adelgid and two biological control predatory beetle species in the Great Smoky Mountains National Park</a:t>
               </a:r>
             </a:p>
           </p:txBody>

</xml_diff>